<commit_message>
final version of javascript training.
</commit_message>
<xml_diff>
--- a/03.JavaScript/JavaScript.pptx
+++ b/03.JavaScript/JavaScript.pptx
@@ -5,7 +5,7 @@
     <p:sldMasterId id="2147483648" r:id="rId1"/>
   </p:sldMasterIdLst>
   <p:notesMasterIdLst>
-    <p:notesMasterId r:id="rId34"/>
+    <p:notesMasterId r:id="rId37"/>
   </p:notesMasterIdLst>
   <p:sldIdLst>
     <p:sldId id="260" r:id="rId2"/>
@@ -40,6 +40,9 @@
     <p:sldId id="295" r:id="rId31"/>
     <p:sldId id="291" r:id="rId32"/>
     <p:sldId id="292" r:id="rId33"/>
+    <p:sldId id="300" r:id="rId34"/>
+    <p:sldId id="301" r:id="rId35"/>
+    <p:sldId id="302" r:id="rId36"/>
   </p:sldIdLst>
   <p:sldSz cx="12192000" cy="6858000"/>
   <p:notesSz cx="6858000" cy="9144000"/>
@@ -3130,7 +3133,7 @@
             <a:fld id="{E2D8D627-E559-1D4B-8176-9402CD03DC11}" type="datetimeFigureOut">
               <a:rPr lang="en-US" smtClean="0"/>
               <a:pPr/>
-              <a:t>5/27/2016</a:t>
+              <a:t>5/28/2016</a:t>
             </a:fld>
             <a:endParaRPr lang="en-US"/>
           </a:p>
@@ -3467,7 +3470,7 @@
               <a:pPr/>
               <a:t>1</a:t>
             </a:fld>
-            <a:endParaRPr lang="en-US"/>
+            <a:endParaRPr lang="en-US" dirty="0"/>
           </a:p>
         </p:txBody>
       </p:sp>
@@ -4062,7 +4065,7 @@
               <a:pPr/>
               <a:t>16</a:t>
             </a:fld>
-            <a:endParaRPr lang="en-US"/>
+            <a:endParaRPr lang="en-US" dirty="0"/>
           </a:p>
         </p:txBody>
       </p:sp>
@@ -4147,7 +4150,7 @@
               <a:pPr/>
               <a:t>17</a:t>
             </a:fld>
-            <a:endParaRPr lang="en-US"/>
+            <a:endParaRPr lang="en-US" dirty="0"/>
           </a:p>
         </p:txBody>
       </p:sp>
@@ -4232,7 +4235,7 @@
               <a:pPr/>
               <a:t>18</a:t>
             </a:fld>
-            <a:endParaRPr lang="en-US"/>
+            <a:endParaRPr lang="en-US" dirty="0"/>
           </a:p>
         </p:txBody>
       </p:sp>
@@ -4317,7 +4320,7 @@
               <a:pPr/>
               <a:t>19</a:t>
             </a:fld>
-            <a:endParaRPr lang="en-US"/>
+            <a:endParaRPr lang="en-US" dirty="0"/>
           </a:p>
         </p:txBody>
       </p:sp>
@@ -4402,7 +4405,7 @@
               <a:pPr/>
               <a:t>2</a:t>
             </a:fld>
-            <a:endParaRPr lang="en-US"/>
+            <a:endParaRPr lang="en-US" dirty="0"/>
           </a:p>
         </p:txBody>
       </p:sp>
@@ -4487,7 +4490,7 @@
               <a:pPr/>
               <a:t>20</a:t>
             </a:fld>
-            <a:endParaRPr lang="en-US"/>
+            <a:endParaRPr lang="en-US" dirty="0"/>
           </a:p>
         </p:txBody>
       </p:sp>
@@ -4576,7 +4579,7 @@
               <a:pPr/>
               <a:t>21</a:t>
             </a:fld>
-            <a:endParaRPr lang="en-US"/>
+            <a:endParaRPr lang="en-US" dirty="0"/>
           </a:p>
         </p:txBody>
       </p:sp>
@@ -4661,7 +4664,7 @@
               <a:pPr/>
               <a:t>22</a:t>
             </a:fld>
-            <a:endParaRPr lang="en-US"/>
+            <a:endParaRPr lang="en-US" dirty="0"/>
           </a:p>
         </p:txBody>
       </p:sp>
@@ -4750,7 +4753,7 @@
               <a:pPr/>
               <a:t>23</a:t>
             </a:fld>
-            <a:endParaRPr lang="en-US"/>
+            <a:endParaRPr lang="en-US" dirty="0"/>
           </a:p>
         </p:txBody>
       </p:sp>
@@ -4835,7 +4838,7 @@
               <a:pPr/>
               <a:t>24</a:t>
             </a:fld>
-            <a:endParaRPr lang="en-US"/>
+            <a:endParaRPr lang="en-US" dirty="0"/>
           </a:p>
         </p:txBody>
       </p:sp>
@@ -4920,7 +4923,7 @@
               <a:pPr/>
               <a:t>25</a:t>
             </a:fld>
-            <a:endParaRPr lang="en-US"/>
+            <a:endParaRPr lang="en-US" dirty="0"/>
           </a:p>
         </p:txBody>
       </p:sp>
@@ -5005,7 +5008,7 @@
               <a:pPr/>
               <a:t>26</a:t>
             </a:fld>
-            <a:endParaRPr lang="en-US"/>
+            <a:endParaRPr lang="en-US" dirty="0"/>
           </a:p>
         </p:txBody>
       </p:sp>
@@ -5345,7 +5348,7 @@
               <a:pPr/>
               <a:t>3</a:t>
             </a:fld>
-            <a:endParaRPr lang="en-US"/>
+            <a:endParaRPr lang="en-US" dirty="0"/>
           </a:p>
         </p:txBody>
       </p:sp>
@@ -5627,6 +5630,261 @@
 </p:notes>
 </file>
 
+<file path=ppt/notesSlides/notesSlide33.xml><?xml version="1.0" encoding="utf-8"?>
+<p:notes xmlns:a="http://schemas.openxmlformats.org/drawingml/2006/main" xmlns:r="http://schemas.openxmlformats.org/officeDocument/2006/relationships" xmlns:p="http://schemas.openxmlformats.org/presentationml/2006/main">
+  <p:cSld>
+    <p:spTree>
+      <p:nvGrpSpPr>
+        <p:cNvPr id="1" name=""/>
+        <p:cNvGrpSpPr/>
+        <p:nvPr/>
+      </p:nvGrpSpPr>
+      <p:grpSpPr>
+        <a:xfrm>
+          <a:off x="0" y="0"/>
+          <a:ext cx="0" cy="0"/>
+          <a:chOff x="0" y="0"/>
+          <a:chExt cx="0" cy="0"/>
+        </a:xfrm>
+      </p:grpSpPr>
+      <p:sp>
+        <p:nvSpPr>
+          <p:cNvPr id="2" name="Slide Image Placeholder 1"/>
+          <p:cNvSpPr>
+            <a:spLocks noGrp="1" noRot="1" noChangeAspect="1"/>
+          </p:cNvSpPr>
+          <p:nvPr>
+            <p:ph type="sldImg"/>
+          </p:nvPr>
+        </p:nvSpPr>
+        <p:spPr/>
+      </p:sp>
+      <p:sp>
+        <p:nvSpPr>
+          <p:cNvPr id="3" name="Notes Placeholder 2"/>
+          <p:cNvSpPr>
+            <a:spLocks noGrp="1"/>
+          </p:cNvSpPr>
+          <p:nvPr>
+            <p:ph type="body" idx="1"/>
+          </p:nvPr>
+        </p:nvSpPr>
+        <p:spPr/>
+        <p:txBody>
+          <a:bodyPr/>
+          <a:lstStyle/>
+          <a:p>
+            <a:endParaRPr lang="en-US" dirty="0"/>
+          </a:p>
+        </p:txBody>
+      </p:sp>
+      <p:sp>
+        <p:nvSpPr>
+          <p:cNvPr id="4" name="Slide Number Placeholder 3"/>
+          <p:cNvSpPr>
+            <a:spLocks noGrp="1"/>
+          </p:cNvSpPr>
+          <p:nvPr>
+            <p:ph type="sldNum" sz="quarter" idx="10"/>
+          </p:nvPr>
+        </p:nvSpPr>
+        <p:spPr/>
+        <p:txBody>
+          <a:bodyPr/>
+          <a:lstStyle/>
+          <a:p>
+            <a:fld id="{8ABC5F5D-F15C-8846-AC21-6CDE416EB847}" type="slidenum">
+              <a:rPr lang="en-US" smtClean="0"/>
+              <a:pPr/>
+              <a:t>33</a:t>
+            </a:fld>
+            <a:endParaRPr lang="en-US"/>
+          </a:p>
+        </p:txBody>
+      </p:sp>
+    </p:spTree>
+    <p:extLst>
+      <p:ext uri="{BB962C8B-B14F-4D97-AF65-F5344CB8AC3E}">
+        <p14:creationId xmlns:p14="http://schemas.microsoft.com/office/powerpoint/2010/main" xmlns="" val="275206236"/>
+      </p:ext>
+    </p:extLst>
+  </p:cSld>
+  <p:clrMapOvr>
+    <a:masterClrMapping/>
+  </p:clrMapOvr>
+</p:notes>
+</file>
+
+<file path=ppt/notesSlides/notesSlide34.xml><?xml version="1.0" encoding="utf-8"?>
+<p:notes xmlns:a="http://schemas.openxmlformats.org/drawingml/2006/main" xmlns:r="http://schemas.openxmlformats.org/officeDocument/2006/relationships" xmlns:p="http://schemas.openxmlformats.org/presentationml/2006/main">
+  <p:cSld>
+    <p:spTree>
+      <p:nvGrpSpPr>
+        <p:cNvPr id="1" name=""/>
+        <p:cNvGrpSpPr/>
+        <p:nvPr/>
+      </p:nvGrpSpPr>
+      <p:grpSpPr>
+        <a:xfrm>
+          <a:off x="0" y="0"/>
+          <a:ext cx="0" cy="0"/>
+          <a:chOff x="0" y="0"/>
+          <a:chExt cx="0" cy="0"/>
+        </a:xfrm>
+      </p:grpSpPr>
+      <p:sp>
+        <p:nvSpPr>
+          <p:cNvPr id="2" name="Slide Image Placeholder 1"/>
+          <p:cNvSpPr>
+            <a:spLocks noGrp="1" noRot="1" noChangeAspect="1"/>
+          </p:cNvSpPr>
+          <p:nvPr>
+            <p:ph type="sldImg"/>
+          </p:nvPr>
+        </p:nvSpPr>
+        <p:spPr/>
+      </p:sp>
+      <p:sp>
+        <p:nvSpPr>
+          <p:cNvPr id="3" name="Notes Placeholder 2"/>
+          <p:cNvSpPr>
+            <a:spLocks noGrp="1"/>
+          </p:cNvSpPr>
+          <p:nvPr>
+            <p:ph type="body" idx="1"/>
+          </p:nvPr>
+        </p:nvSpPr>
+        <p:spPr/>
+        <p:txBody>
+          <a:bodyPr/>
+          <a:lstStyle/>
+          <a:p>
+            <a:endParaRPr lang="en-US" dirty="0"/>
+          </a:p>
+        </p:txBody>
+      </p:sp>
+      <p:sp>
+        <p:nvSpPr>
+          <p:cNvPr id="4" name="Slide Number Placeholder 3"/>
+          <p:cNvSpPr>
+            <a:spLocks noGrp="1"/>
+          </p:cNvSpPr>
+          <p:nvPr>
+            <p:ph type="sldNum" sz="quarter" idx="10"/>
+          </p:nvPr>
+        </p:nvSpPr>
+        <p:spPr/>
+        <p:txBody>
+          <a:bodyPr/>
+          <a:lstStyle/>
+          <a:p>
+            <a:fld id="{8ABC5F5D-F15C-8846-AC21-6CDE416EB847}" type="slidenum">
+              <a:rPr lang="en-US" smtClean="0"/>
+              <a:pPr/>
+              <a:t>34</a:t>
+            </a:fld>
+            <a:endParaRPr lang="en-US"/>
+          </a:p>
+        </p:txBody>
+      </p:sp>
+    </p:spTree>
+    <p:extLst>
+      <p:ext uri="{BB962C8B-B14F-4D97-AF65-F5344CB8AC3E}">
+        <p14:creationId xmlns:p14="http://schemas.microsoft.com/office/powerpoint/2010/main" xmlns="" val="275206236"/>
+      </p:ext>
+    </p:extLst>
+  </p:cSld>
+  <p:clrMapOvr>
+    <a:masterClrMapping/>
+  </p:clrMapOvr>
+</p:notes>
+</file>
+
+<file path=ppt/notesSlides/notesSlide35.xml><?xml version="1.0" encoding="utf-8"?>
+<p:notes xmlns:a="http://schemas.openxmlformats.org/drawingml/2006/main" xmlns:r="http://schemas.openxmlformats.org/officeDocument/2006/relationships" xmlns:p="http://schemas.openxmlformats.org/presentationml/2006/main">
+  <p:cSld>
+    <p:spTree>
+      <p:nvGrpSpPr>
+        <p:cNvPr id="1" name=""/>
+        <p:cNvGrpSpPr/>
+        <p:nvPr/>
+      </p:nvGrpSpPr>
+      <p:grpSpPr>
+        <a:xfrm>
+          <a:off x="0" y="0"/>
+          <a:ext cx="0" cy="0"/>
+          <a:chOff x="0" y="0"/>
+          <a:chExt cx="0" cy="0"/>
+        </a:xfrm>
+      </p:grpSpPr>
+      <p:sp>
+        <p:nvSpPr>
+          <p:cNvPr id="2" name="Slide Image Placeholder 1"/>
+          <p:cNvSpPr>
+            <a:spLocks noGrp="1" noRot="1" noChangeAspect="1"/>
+          </p:cNvSpPr>
+          <p:nvPr>
+            <p:ph type="sldImg"/>
+          </p:nvPr>
+        </p:nvSpPr>
+        <p:spPr/>
+      </p:sp>
+      <p:sp>
+        <p:nvSpPr>
+          <p:cNvPr id="3" name="Notes Placeholder 2"/>
+          <p:cNvSpPr>
+            <a:spLocks noGrp="1"/>
+          </p:cNvSpPr>
+          <p:nvPr>
+            <p:ph type="body" idx="1"/>
+          </p:nvPr>
+        </p:nvSpPr>
+        <p:spPr/>
+        <p:txBody>
+          <a:bodyPr/>
+          <a:lstStyle/>
+          <a:p>
+            <a:endParaRPr lang="en-US" dirty="0"/>
+          </a:p>
+        </p:txBody>
+      </p:sp>
+      <p:sp>
+        <p:nvSpPr>
+          <p:cNvPr id="4" name="Slide Number Placeholder 3"/>
+          <p:cNvSpPr>
+            <a:spLocks noGrp="1"/>
+          </p:cNvSpPr>
+          <p:nvPr>
+            <p:ph type="sldNum" sz="quarter" idx="10"/>
+          </p:nvPr>
+        </p:nvSpPr>
+        <p:spPr/>
+        <p:txBody>
+          <a:bodyPr/>
+          <a:lstStyle/>
+          <a:p>
+            <a:fld id="{8ABC5F5D-F15C-8846-AC21-6CDE416EB847}" type="slidenum">
+              <a:rPr lang="en-US" smtClean="0"/>
+              <a:pPr/>
+              <a:t>35</a:t>
+            </a:fld>
+            <a:endParaRPr lang="en-US"/>
+          </a:p>
+        </p:txBody>
+      </p:sp>
+    </p:spTree>
+    <p:extLst>
+      <p:ext uri="{BB962C8B-B14F-4D97-AF65-F5344CB8AC3E}">
+        <p14:creationId xmlns:p14="http://schemas.microsoft.com/office/powerpoint/2010/main" xmlns="" val="275206236"/>
+      </p:ext>
+    </p:extLst>
+  </p:cSld>
+  <p:clrMapOvr>
+    <a:masterClrMapping/>
+  </p:clrMapOvr>
+</p:notes>
+</file>
+
 <file path=ppt/notesSlides/notesSlide4.xml><?xml version="1.0" encoding="utf-8"?>
 <p:notes xmlns:a="http://schemas.openxmlformats.org/drawingml/2006/main" xmlns:r="http://schemas.openxmlformats.org/officeDocument/2006/relationships" xmlns:p="http://schemas.openxmlformats.org/presentationml/2006/main">
   <p:cSld>
@@ -6324,7 +6582,7 @@
             <a:fld id="{4AAD347D-5ACD-4C99-B74B-A9C85AD731AF}" type="datetimeFigureOut">
               <a:rPr lang="en-US" dirty="0"/>
               <a:pPr/>
-              <a:t>5/27/2016</a:t>
+              <a:t>5/28/2016</a:t>
             </a:fld>
             <a:endParaRPr lang="en-US" dirty="0"/>
           </a:p>
@@ -6596,7 +6854,7 @@
             <a:fld id="{4509A250-FF31-4206-8172-F9D3106AACB1}" type="datetimeFigureOut">
               <a:rPr lang="en-US" dirty="0"/>
               <a:pPr/>
-              <a:t>5/27/2016</a:t>
+              <a:t>5/28/2016</a:t>
             </a:fld>
             <a:endParaRPr lang="en-US" dirty="0"/>
           </a:p>
@@ -6787,7 +7045,7 @@
             <a:fld id="{4509A250-FF31-4206-8172-F9D3106AACB1}" type="datetimeFigureOut">
               <a:rPr lang="en-US" dirty="0"/>
               <a:pPr/>
-              <a:t>5/27/2016</a:t>
+              <a:t>5/28/2016</a:t>
             </a:fld>
             <a:endParaRPr lang="en-US" dirty="0"/>
           </a:p>
@@ -7057,7 +7315,7 @@
             <a:fld id="{4509A250-FF31-4206-8172-F9D3106AACB1}" type="datetimeFigureOut">
               <a:rPr lang="en-US" dirty="0"/>
               <a:pPr/>
-              <a:t>5/27/2016</a:t>
+              <a:t>5/28/2016</a:t>
             </a:fld>
             <a:endParaRPr lang="en-US" dirty="0"/>
           </a:p>
@@ -7395,7 +7653,7 @@
             <a:fld id="{4509A250-FF31-4206-8172-F9D3106AACB1}" type="datetimeFigureOut">
               <a:rPr lang="en-US" dirty="0"/>
               <a:pPr/>
-              <a:t>5/27/2016</a:t>
+              <a:t>5/28/2016</a:t>
             </a:fld>
             <a:endParaRPr lang="en-US" dirty="0"/>
           </a:p>
@@ -8015,7 +8273,7 @@
             <a:fld id="{4509A250-FF31-4206-8172-F9D3106AACB1}" type="datetimeFigureOut">
               <a:rPr lang="en-US" dirty="0"/>
               <a:pPr/>
-              <a:t>5/27/2016</a:t>
+              <a:t>5/28/2016</a:t>
             </a:fld>
             <a:endParaRPr lang="en-US" dirty="0"/>
           </a:p>
@@ -8872,7 +9130,7 @@
             <a:fld id="{4509A250-FF31-4206-8172-F9D3106AACB1}" type="datetimeFigureOut">
               <a:rPr lang="en-US" dirty="0"/>
               <a:pPr/>
-              <a:t>5/27/2016</a:t>
+              <a:t>5/28/2016</a:t>
             </a:fld>
             <a:endParaRPr lang="en-US" dirty="0"/>
           </a:p>
@@ -9039,7 +9297,7 @@
             <a:fld id="{4509A250-FF31-4206-8172-F9D3106AACB1}" type="datetimeFigureOut">
               <a:rPr lang="en-US" dirty="0"/>
               <a:pPr/>
-              <a:t>5/27/2016</a:t>
+              <a:t>5/28/2016</a:t>
             </a:fld>
             <a:endParaRPr lang="en-US" dirty="0"/>
           </a:p>
@@ -9216,7 +9474,7 @@
             <a:fld id="{4509A250-FF31-4206-8172-F9D3106AACB1}" type="datetimeFigureOut">
               <a:rPr lang="en-US" dirty="0"/>
               <a:pPr/>
-              <a:t>5/27/2016</a:t>
+              <a:t>5/28/2016</a:t>
             </a:fld>
             <a:endParaRPr lang="en-US" dirty="0"/>
           </a:p>
@@ -9383,7 +9641,7 @@
             <a:fld id="{4509A250-FF31-4206-8172-F9D3106AACB1}" type="datetimeFigureOut">
               <a:rPr lang="en-US" dirty="0"/>
               <a:pPr/>
-              <a:t>5/27/2016</a:t>
+              <a:t>5/28/2016</a:t>
             </a:fld>
             <a:endParaRPr lang="en-US" dirty="0"/>
           </a:p>
@@ -9627,7 +9885,7 @@
             <a:fld id="{9796027F-7875-4030-9381-8BD8C4F21935}" type="datetimeFigureOut">
               <a:rPr lang="en-US" dirty="0"/>
               <a:pPr/>
-              <a:t>5/27/2016</a:t>
+              <a:t>5/28/2016</a:t>
             </a:fld>
             <a:endParaRPr lang="en-US" dirty="0"/>
           </a:p>
@@ -9916,7 +10174,7 @@
             <a:fld id="{9796027F-7875-4030-9381-8BD8C4F21935}" type="datetimeFigureOut">
               <a:rPr lang="en-US" dirty="0"/>
               <a:pPr/>
-              <a:t>5/27/2016</a:t>
+              <a:t>5/28/2016</a:t>
             </a:fld>
             <a:endParaRPr lang="en-US" dirty="0"/>
           </a:p>
@@ -10357,7 +10615,7 @@
             <a:fld id="{9796027F-7875-4030-9381-8BD8C4F21935}" type="datetimeFigureOut">
               <a:rPr lang="en-US" dirty="0"/>
               <a:pPr/>
-              <a:t>5/27/2016</a:t>
+              <a:t>5/28/2016</a:t>
             </a:fld>
             <a:endParaRPr lang="en-US" dirty="0"/>
           </a:p>
@@ -10472,7 +10730,7 @@
             <a:fld id="{4509A250-FF31-4206-8172-F9D3106AACB1}" type="datetimeFigureOut">
               <a:rPr lang="en-US" dirty="0"/>
               <a:pPr/>
-              <a:t>5/27/2016</a:t>
+              <a:t>5/28/2016</a:t>
             </a:fld>
             <a:endParaRPr lang="en-US" dirty="0"/>
           </a:p>
@@ -10564,7 +10822,7 @@
             <a:fld id="{4509A250-FF31-4206-8172-F9D3106AACB1}" type="datetimeFigureOut">
               <a:rPr lang="en-US" dirty="0"/>
               <a:pPr/>
-              <a:t>5/27/2016</a:t>
+              <a:t>5/28/2016</a:t>
             </a:fld>
             <a:endParaRPr lang="en-US" dirty="0"/>
           </a:p>
@@ -10840,7 +11098,7 @@
             <a:fld id="{4509A250-FF31-4206-8172-F9D3106AACB1}" type="datetimeFigureOut">
               <a:rPr lang="en-US" dirty="0"/>
               <a:pPr/>
-              <a:t>5/27/2016</a:t>
+              <a:t>5/28/2016</a:t>
             </a:fld>
             <a:endParaRPr lang="en-US" dirty="0"/>
           </a:p>
@@ -11112,7 +11370,7 @@
             <a:fld id="{4509A250-FF31-4206-8172-F9D3106AACB1}" type="datetimeFigureOut">
               <a:rPr lang="en-US" dirty="0"/>
               <a:pPr/>
-              <a:t>5/27/2016</a:t>
+              <a:t>5/28/2016</a:t>
             </a:fld>
             <a:endParaRPr lang="en-US" dirty="0"/>
           </a:p>
@@ -11538,7 +11796,7 @@
             <a:fld id="{4AAD347D-5ACD-4C99-B74B-A9C85AD731AF}" type="datetimeFigureOut">
               <a:rPr lang="en-US" dirty="0"/>
               <a:pPr/>
-              <a:t>5/27/2016</a:t>
+              <a:t>5/28/2016</a:t>
             </a:fld>
             <a:endParaRPr lang="en-US" dirty="0"/>
           </a:p>
@@ -13918,7 +14176,6 @@
               <a:rPr lang="en-US" altLang="zh-CN" sz="2400" dirty="0" smtClean="0"/>
               <a:t>||</a:t>
             </a:r>
-            <a:endParaRPr lang="en-US" altLang="zh-CN" sz="2400" dirty="0" smtClean="0"/>
           </a:p>
           <a:p>
             <a:pPr lvl="1">
@@ -13946,7 +14203,6 @@
               <a:rPr lang="en-US" altLang="zh-CN" sz="2400" dirty="0" smtClean="0"/>
               <a:t>^</a:t>
             </a:r>
-            <a:endParaRPr lang="en-US" altLang="zh-CN" sz="2400" dirty="0" smtClean="0"/>
           </a:p>
           <a:p>
             <a:pPr lvl="1">
@@ -13962,11 +14218,7 @@
             </a:r>
             <a:r>
               <a:rPr lang="en-US" altLang="zh-CN" sz="2400" dirty="0" smtClean="0"/>
-              <a:t> </a:t>
-            </a:r>
-            <a:r>
-              <a:rPr lang="en-US" altLang="zh-CN" sz="2400" dirty="0" smtClean="0"/>
-              <a:t> </a:t>
+              <a:t>  </a:t>
             </a:r>
             <a:r>
               <a:rPr lang="zh-CN" altLang="en-US" sz="2400" dirty="0" smtClean="0"/>
@@ -17501,7 +17753,6 @@
               <a:rPr lang="en-US" altLang="zh-CN" sz="2400" dirty="0" smtClean="0"/>
               <a:t>method</a:t>
             </a:r>
-            <a:endParaRPr lang="en-US" altLang="zh-CN" sz="2400" dirty="0" smtClean="0"/>
           </a:p>
         </p:txBody>
       </p:sp>
@@ -17854,15 +18105,7 @@
           <a:p>
             <a:r>
               <a:rPr lang="zh-CN" altLang="en-US" sz="4400" dirty="0" smtClean="0"/>
-              <a:t>对象</a:t>
-            </a:r>
-            <a:r>
-              <a:rPr lang="zh-CN" altLang="en-US" sz="4400" dirty="0" smtClean="0"/>
-              <a:t>的</a:t>
-            </a:r>
-            <a:r>
-              <a:rPr lang="zh-CN" altLang="en-US" sz="4400" dirty="0" smtClean="0"/>
-              <a:t>读取</a:t>
+              <a:t>对象的读取</a:t>
             </a:r>
             <a:r>
               <a:rPr lang="en-US" altLang="zh-CN" sz="4400" dirty="0" smtClean="0"/>
@@ -17910,11 +18153,7 @@
             </a:r>
             <a:r>
               <a:rPr lang="en-US" altLang="zh-CN" sz="2400" dirty="0" smtClean="0"/>
-              <a:t>: city.name</a:t>
-            </a:r>
-            <a:r>
-              <a:rPr lang="en-US" altLang="zh-CN" sz="2400" dirty="0" smtClean="0"/>
-              <a:t>=</a:t>
+              <a:t>: city.name=</a:t>
             </a:r>
             <a:r>
               <a:rPr lang="en-US" altLang="zh-CN" sz="2400" dirty="0" smtClean="0">
@@ -17953,11 +18192,7 @@
             </a:r>
             <a:r>
               <a:rPr lang="en-US" altLang="zh-CN" sz="2400" dirty="0" smtClean="0"/>
-              <a:t>: city[“Name</a:t>
-            </a:r>
-            <a:r>
-              <a:rPr lang="en-US" altLang="zh-CN" sz="2400" dirty="0" smtClean="0"/>
-              <a:t>”]=</a:t>
+              <a:t>: city[“Name”]=</a:t>
             </a:r>
             <a:r>
               <a:rPr lang="en-US" altLang="zh-CN" sz="2400" dirty="0" smtClean="0">
@@ -17975,7 +18210,6 @@
               <a:rPr lang="zh-CN" altLang="en-US" sz="2400" dirty="0" smtClean="0"/>
               <a:t> </a:t>
             </a:r>
-            <a:endParaRPr lang="zh-CN" altLang="en-US" sz="2400" dirty="0" smtClean="0"/>
           </a:p>
           <a:p>
             <a:pPr>
@@ -18126,7 +18360,15 @@
             </a:r>
             <a:r>
               <a:rPr lang="en-US" sz="4400" dirty="0" smtClean="0"/>
-              <a:t>Fibonacci sequence</a:t>
+              <a:t>Fibonacci </a:t>
+            </a:r>
+            <a:r>
+              <a:rPr lang="en-US" sz="4400" dirty="0" smtClean="0"/>
+              <a:t>se </a:t>
+            </a:r>
+            <a:r>
+              <a:rPr lang="en-US" sz="4400" dirty="0" err="1" smtClean="0"/>
+              <a:t>quence</a:t>
             </a:r>
             <a:r>
               <a:rPr lang="en-US" altLang="zh-CN" sz="4400" dirty="0"/>
@@ -18393,6 +18635,598 @@
           <a:xfrm>
             <a:off x="2022920" y="1620679"/>
             <a:ext cx="8027914" cy="4337552"/>
+          </a:xfrm>
+        </p:spPr>
+      </p:pic>
+    </p:spTree>
+    <p:extLst>
+      <p:ext uri="{BB962C8B-B14F-4D97-AF65-F5344CB8AC3E}">
+        <p14:creationId xmlns:p14="http://schemas.microsoft.com/office/powerpoint/2010/main" xmlns="" val="2036312712"/>
+      </p:ext>
+    </p:extLst>
+  </p:cSld>
+  <p:clrMapOvr>
+    <a:masterClrMapping/>
+  </p:clrMapOvr>
+  <p:timing>
+    <p:tnLst>
+      <p:par>
+        <p:cTn id="1" dur="indefinite" restart="never" nodeType="tmRoot">
+          <p:childTnLst>
+            <p:seq concurrent="1" nextAc="seek">
+              <p:cTn id="2" dur="indefinite" nodeType="mainSeq">
+                <p:childTnLst>
+                  <p:par>
+                    <p:cTn id="3" fill="hold">
+                      <p:stCondLst>
+                        <p:cond delay="indefinite"/>
+                      </p:stCondLst>
+                      <p:childTnLst>
+                        <p:par>
+                          <p:cTn id="4" fill="hold">
+                            <p:stCondLst>
+                              <p:cond delay="0"/>
+                            </p:stCondLst>
+                            <p:childTnLst>
+                              <p:par>
+                                <p:cTn id="5" presetID="5" presetClass="entr" presetSubtype="10" fill="hold" grpId="0" nodeType="clickEffect">
+                                  <p:stCondLst>
+                                    <p:cond delay="0"/>
+                                  </p:stCondLst>
+                                  <p:childTnLst>
+                                    <p:set>
+                                      <p:cBhvr>
+                                        <p:cTn id="6" dur="1" fill="hold">
+                                          <p:stCondLst>
+                                            <p:cond delay="0"/>
+                                          </p:stCondLst>
+                                        </p:cTn>
+                                        <p:tgtEl>
+                                          <p:spTgt spid="9"/>
+                                        </p:tgtEl>
+                                        <p:attrNameLst>
+                                          <p:attrName>style.visibility</p:attrName>
+                                        </p:attrNameLst>
+                                      </p:cBhvr>
+                                      <p:to>
+                                        <p:strVal val="visible"/>
+                                      </p:to>
+                                    </p:set>
+                                    <p:animEffect transition="in" filter="checkerboard(across)">
+                                      <p:cBhvr>
+                                        <p:cTn id="7" dur="500"/>
+                                        <p:tgtEl>
+                                          <p:spTgt spid="9"/>
+                                        </p:tgtEl>
+                                      </p:cBhvr>
+                                    </p:animEffect>
+                                  </p:childTnLst>
+                                </p:cTn>
+                              </p:par>
+                            </p:childTnLst>
+                          </p:cTn>
+                        </p:par>
+                      </p:childTnLst>
+                    </p:cTn>
+                  </p:par>
+                </p:childTnLst>
+              </p:cTn>
+              <p:prevCondLst>
+                <p:cond evt="onPrev" delay="0">
+                  <p:tgtEl>
+                    <p:sldTgt/>
+                  </p:tgtEl>
+                </p:cond>
+              </p:prevCondLst>
+              <p:nextCondLst>
+                <p:cond evt="onNext" delay="0">
+                  <p:tgtEl>
+                    <p:sldTgt/>
+                  </p:tgtEl>
+                </p:cond>
+              </p:nextCondLst>
+            </p:seq>
+          </p:childTnLst>
+        </p:cTn>
+      </p:par>
+    </p:tnLst>
+    <p:bldLst>
+      <p:bldP spid="9" grpId="0"/>
+    </p:bldLst>
+  </p:timing>
+</p:sld>
+</file>
+
+<file path=ppt/slides/slide33.xml><?xml version="1.0" encoding="utf-8"?>
+<p:sld xmlns:a="http://schemas.openxmlformats.org/drawingml/2006/main" xmlns:r="http://schemas.openxmlformats.org/officeDocument/2006/relationships" xmlns:p="http://schemas.openxmlformats.org/presentationml/2006/main">
+  <p:cSld>
+    <p:spTree>
+      <p:nvGrpSpPr>
+        <p:cNvPr id="1" name=""/>
+        <p:cNvGrpSpPr/>
+        <p:nvPr/>
+      </p:nvGrpSpPr>
+      <p:grpSpPr>
+        <a:xfrm>
+          <a:off x="0" y="0"/>
+          <a:ext cx="0" cy="0"/>
+          <a:chOff x="0" y="0"/>
+          <a:chExt cx="0" cy="0"/>
+        </a:xfrm>
+      </p:grpSpPr>
+      <p:sp>
+        <p:nvSpPr>
+          <p:cNvPr id="9" name="Title 8"/>
+          <p:cNvSpPr>
+            <a:spLocks noGrp="1"/>
+          </p:cNvSpPr>
+          <p:nvPr>
+            <p:ph type="title"/>
+          </p:nvPr>
+        </p:nvSpPr>
+        <p:spPr/>
+        <p:txBody>
+          <a:bodyPr/>
+          <a:lstStyle/>
+          <a:p>
+            <a:r>
+              <a:rPr lang="en-US" altLang="zh-CN" sz="4400" dirty="0" smtClean="0"/>
+              <a:t>Douglas </a:t>
+            </a:r>
+            <a:r>
+              <a:rPr lang="en-US" altLang="zh-CN" sz="4400" dirty="0" err="1" smtClean="0"/>
+              <a:t>Crockford</a:t>
+            </a:r>
+            <a:r>
+              <a:rPr lang="en-US" altLang="zh-CN" sz="4400" dirty="0"/>
+              <a:t/>
+            </a:r>
+            <a:br>
+              <a:rPr lang="en-US" altLang="zh-CN" sz="4400" dirty="0"/>
+            </a:br>
+            <a:endParaRPr lang="en-US" dirty="0"/>
+          </a:p>
+        </p:txBody>
+      </p:sp>
+      <p:pic>
+        <p:nvPicPr>
+          <p:cNvPr id="7" name="内容占位符 6" descr="800px-Douglas_Crockford,_February_2013.jpg"/>
+          <p:cNvPicPr>
+            <a:picLocks noGrp="1" noChangeAspect="1"/>
+          </p:cNvPicPr>
+          <p:nvPr>
+            <p:ph sz="half" idx="1"/>
+          </p:nvPr>
+        </p:nvPicPr>
+        <p:blipFill>
+          <a:blip r:embed="rId3"/>
+          <a:stretch>
+            <a:fillRect/>
+          </a:stretch>
+        </p:blipFill>
+        <p:spPr>
+          <a:xfrm>
+            <a:off x="963880" y="1853248"/>
+            <a:ext cx="4690613" cy="3107531"/>
+          </a:xfrm>
+        </p:spPr>
+      </p:pic>
+      <p:pic>
+        <p:nvPicPr>
+          <p:cNvPr id="8" name="内容占位符 7" descr="JavaScript-the-good-parts.jpg"/>
+          <p:cNvPicPr>
+            <a:picLocks noGrp="1" noChangeAspect="1"/>
+          </p:cNvPicPr>
+          <p:nvPr>
+            <p:ph sz="half" idx="2"/>
+          </p:nvPr>
+        </p:nvPicPr>
+        <p:blipFill>
+          <a:blip r:embed="rId4"/>
+          <a:stretch>
+            <a:fillRect/>
+          </a:stretch>
+        </p:blipFill>
+        <p:spPr>
+          <a:xfrm>
+            <a:off x="5902324" y="1969333"/>
+            <a:ext cx="5318125" cy="2991446"/>
+          </a:xfrm>
+        </p:spPr>
+      </p:pic>
+    </p:spTree>
+    <p:extLst>
+      <p:ext uri="{BB962C8B-B14F-4D97-AF65-F5344CB8AC3E}">
+        <p14:creationId xmlns:p14="http://schemas.microsoft.com/office/powerpoint/2010/main" xmlns="" val="2036312712"/>
+      </p:ext>
+    </p:extLst>
+  </p:cSld>
+  <p:clrMapOvr>
+    <a:masterClrMapping/>
+  </p:clrMapOvr>
+  <p:timing>
+    <p:tnLst>
+      <p:par>
+        <p:cTn id="1" dur="indefinite" restart="never" nodeType="tmRoot">
+          <p:childTnLst>
+            <p:seq concurrent="1" nextAc="seek">
+              <p:cTn id="2" dur="indefinite" nodeType="mainSeq">
+                <p:childTnLst>
+                  <p:par>
+                    <p:cTn id="3" fill="hold">
+                      <p:stCondLst>
+                        <p:cond delay="indefinite"/>
+                      </p:stCondLst>
+                      <p:childTnLst>
+                        <p:par>
+                          <p:cTn id="4" fill="hold">
+                            <p:stCondLst>
+                              <p:cond delay="0"/>
+                            </p:stCondLst>
+                            <p:childTnLst>
+                              <p:par>
+                                <p:cTn id="5" presetID="5" presetClass="entr" presetSubtype="10" fill="hold" grpId="0" nodeType="clickEffect">
+                                  <p:stCondLst>
+                                    <p:cond delay="0"/>
+                                  </p:stCondLst>
+                                  <p:childTnLst>
+                                    <p:set>
+                                      <p:cBhvr>
+                                        <p:cTn id="6" dur="1" fill="hold">
+                                          <p:stCondLst>
+                                            <p:cond delay="0"/>
+                                          </p:stCondLst>
+                                        </p:cTn>
+                                        <p:tgtEl>
+                                          <p:spTgt spid="9"/>
+                                        </p:tgtEl>
+                                        <p:attrNameLst>
+                                          <p:attrName>style.visibility</p:attrName>
+                                        </p:attrNameLst>
+                                      </p:cBhvr>
+                                      <p:to>
+                                        <p:strVal val="visible"/>
+                                      </p:to>
+                                    </p:set>
+                                    <p:animEffect transition="in" filter="checkerboard(across)">
+                                      <p:cBhvr>
+                                        <p:cTn id="7" dur="500"/>
+                                        <p:tgtEl>
+                                          <p:spTgt spid="9"/>
+                                        </p:tgtEl>
+                                      </p:cBhvr>
+                                    </p:animEffect>
+                                  </p:childTnLst>
+                                </p:cTn>
+                              </p:par>
+                            </p:childTnLst>
+                          </p:cTn>
+                        </p:par>
+                      </p:childTnLst>
+                    </p:cTn>
+                  </p:par>
+                </p:childTnLst>
+              </p:cTn>
+              <p:prevCondLst>
+                <p:cond evt="onPrev" delay="0">
+                  <p:tgtEl>
+                    <p:sldTgt/>
+                  </p:tgtEl>
+                </p:cond>
+              </p:prevCondLst>
+              <p:nextCondLst>
+                <p:cond evt="onNext" delay="0">
+                  <p:tgtEl>
+                    <p:sldTgt/>
+                  </p:tgtEl>
+                </p:cond>
+              </p:nextCondLst>
+            </p:seq>
+          </p:childTnLst>
+        </p:cTn>
+      </p:par>
+    </p:tnLst>
+    <p:bldLst>
+      <p:bldP spid="9" grpId="0"/>
+    </p:bldLst>
+  </p:timing>
+</p:sld>
+</file>
+
+<file path=ppt/slides/slide34.xml><?xml version="1.0" encoding="utf-8"?>
+<p:sld xmlns:a="http://schemas.openxmlformats.org/drawingml/2006/main" xmlns:r="http://schemas.openxmlformats.org/officeDocument/2006/relationships" xmlns:p="http://schemas.openxmlformats.org/presentationml/2006/main">
+  <p:cSld>
+    <p:spTree>
+      <p:nvGrpSpPr>
+        <p:cNvPr id="1" name=""/>
+        <p:cNvGrpSpPr/>
+        <p:nvPr/>
+      </p:nvGrpSpPr>
+      <p:grpSpPr>
+        <a:xfrm>
+          <a:off x="0" y="0"/>
+          <a:ext cx="0" cy="0"/>
+          <a:chOff x="0" y="0"/>
+          <a:chExt cx="0" cy="0"/>
+        </a:xfrm>
+      </p:grpSpPr>
+      <p:sp>
+        <p:nvSpPr>
+          <p:cNvPr id="9" name="Title 8"/>
+          <p:cNvSpPr>
+            <a:spLocks noGrp="1"/>
+          </p:cNvSpPr>
+          <p:nvPr>
+            <p:ph type="title"/>
+          </p:nvPr>
+        </p:nvSpPr>
+        <p:spPr/>
+        <p:txBody>
+          <a:bodyPr/>
+          <a:lstStyle/>
+          <a:p>
+            <a:r>
+              <a:rPr lang="en-US" altLang="zh-CN" sz="4400" dirty="0" smtClean="0"/>
+              <a:t>John </a:t>
+            </a:r>
+            <a:r>
+              <a:rPr lang="en-US" altLang="zh-CN" sz="4400" dirty="0" err="1" smtClean="0"/>
+              <a:t>Resig</a:t>
+            </a:r>
+            <a:r>
+              <a:rPr lang="en-US" altLang="zh-CN" sz="4400" dirty="0"/>
+              <a:t/>
+            </a:r>
+            <a:br>
+              <a:rPr lang="en-US" altLang="zh-CN" sz="4400" dirty="0"/>
+            </a:br>
+            <a:endParaRPr lang="en-US" dirty="0"/>
+          </a:p>
+        </p:txBody>
+      </p:sp>
+      <p:pic>
+        <p:nvPicPr>
+          <p:cNvPr id="10" name="内容占位符 9" descr="john-resig.jpg"/>
+          <p:cNvPicPr>
+            <a:picLocks noGrp="1" noChangeAspect="1"/>
+          </p:cNvPicPr>
+          <p:nvPr>
+            <p:ph sz="half" idx="1"/>
+          </p:nvPr>
+        </p:nvPicPr>
+        <p:blipFill>
+          <a:blip r:embed="rId3"/>
+          <a:stretch>
+            <a:fillRect/>
+          </a:stretch>
+        </p:blipFill>
+        <p:spPr>
+          <a:xfrm>
+            <a:off x="1350961" y="2055812"/>
+            <a:ext cx="5263729" cy="4200525"/>
+          </a:xfrm>
+        </p:spPr>
+      </p:pic>
+      <p:pic>
+        <p:nvPicPr>
+          <p:cNvPr id="11" name="内容占位符 10" descr="jsninja-cover.sm.jpg"/>
+          <p:cNvPicPr>
+            <a:picLocks noGrp="1" noChangeAspect="1"/>
+          </p:cNvPicPr>
+          <p:nvPr>
+            <p:ph sz="half" idx="2"/>
+          </p:nvPr>
+        </p:nvPicPr>
+        <p:blipFill>
+          <a:blip r:embed="rId4"/>
+          <a:stretch>
+            <a:fillRect/>
+          </a:stretch>
+        </p:blipFill>
+        <p:spPr>
+          <a:xfrm>
+            <a:off x="7852569" y="2055813"/>
+            <a:ext cx="3347032" cy="4200525"/>
+          </a:xfrm>
+        </p:spPr>
+      </p:pic>
+    </p:spTree>
+    <p:extLst>
+      <p:ext uri="{BB962C8B-B14F-4D97-AF65-F5344CB8AC3E}">
+        <p14:creationId xmlns:p14="http://schemas.microsoft.com/office/powerpoint/2010/main" xmlns="" val="2036312712"/>
+      </p:ext>
+    </p:extLst>
+  </p:cSld>
+  <p:clrMapOvr>
+    <a:masterClrMapping/>
+  </p:clrMapOvr>
+  <p:timing>
+    <p:tnLst>
+      <p:par>
+        <p:cTn id="1" dur="indefinite" restart="never" nodeType="tmRoot">
+          <p:childTnLst>
+            <p:seq concurrent="1" nextAc="seek">
+              <p:cTn id="2" dur="indefinite" nodeType="mainSeq">
+                <p:childTnLst>
+                  <p:par>
+                    <p:cTn id="3" fill="hold">
+                      <p:stCondLst>
+                        <p:cond delay="indefinite"/>
+                      </p:stCondLst>
+                      <p:childTnLst>
+                        <p:par>
+                          <p:cTn id="4" fill="hold">
+                            <p:stCondLst>
+                              <p:cond delay="0"/>
+                            </p:stCondLst>
+                            <p:childTnLst>
+                              <p:par>
+                                <p:cTn id="5" presetID="5" presetClass="entr" presetSubtype="10" fill="hold" grpId="0" nodeType="clickEffect">
+                                  <p:stCondLst>
+                                    <p:cond delay="0"/>
+                                  </p:stCondLst>
+                                  <p:childTnLst>
+                                    <p:set>
+                                      <p:cBhvr>
+                                        <p:cTn id="6" dur="1" fill="hold">
+                                          <p:stCondLst>
+                                            <p:cond delay="0"/>
+                                          </p:stCondLst>
+                                        </p:cTn>
+                                        <p:tgtEl>
+                                          <p:spTgt spid="9"/>
+                                        </p:tgtEl>
+                                        <p:attrNameLst>
+                                          <p:attrName>style.visibility</p:attrName>
+                                        </p:attrNameLst>
+                                      </p:cBhvr>
+                                      <p:to>
+                                        <p:strVal val="visible"/>
+                                      </p:to>
+                                    </p:set>
+                                    <p:animEffect transition="in" filter="checkerboard(across)">
+                                      <p:cBhvr>
+                                        <p:cTn id="7" dur="500"/>
+                                        <p:tgtEl>
+                                          <p:spTgt spid="9"/>
+                                        </p:tgtEl>
+                                      </p:cBhvr>
+                                    </p:animEffect>
+                                  </p:childTnLst>
+                                </p:cTn>
+                              </p:par>
+                            </p:childTnLst>
+                          </p:cTn>
+                        </p:par>
+                      </p:childTnLst>
+                    </p:cTn>
+                  </p:par>
+                </p:childTnLst>
+              </p:cTn>
+              <p:prevCondLst>
+                <p:cond evt="onPrev" delay="0">
+                  <p:tgtEl>
+                    <p:sldTgt/>
+                  </p:tgtEl>
+                </p:cond>
+              </p:prevCondLst>
+              <p:nextCondLst>
+                <p:cond evt="onNext" delay="0">
+                  <p:tgtEl>
+                    <p:sldTgt/>
+                  </p:tgtEl>
+                </p:cond>
+              </p:nextCondLst>
+            </p:seq>
+          </p:childTnLst>
+        </p:cTn>
+      </p:par>
+    </p:tnLst>
+    <p:bldLst>
+      <p:bldP spid="9" grpId="0"/>
+    </p:bldLst>
+  </p:timing>
+</p:sld>
+</file>
+
+<file path=ppt/slides/slide35.xml><?xml version="1.0" encoding="utf-8"?>
+<p:sld xmlns:a="http://schemas.openxmlformats.org/drawingml/2006/main" xmlns:r="http://schemas.openxmlformats.org/officeDocument/2006/relationships" xmlns:p="http://schemas.openxmlformats.org/presentationml/2006/main">
+  <p:cSld>
+    <p:spTree>
+      <p:nvGrpSpPr>
+        <p:cNvPr id="1" name=""/>
+        <p:cNvGrpSpPr/>
+        <p:nvPr/>
+      </p:nvGrpSpPr>
+      <p:grpSpPr>
+        <a:xfrm>
+          <a:off x="0" y="0"/>
+          <a:ext cx="0" cy="0"/>
+          <a:chOff x="0" y="0"/>
+          <a:chExt cx="0" cy="0"/>
+        </a:xfrm>
+      </p:grpSpPr>
+      <p:sp>
+        <p:nvSpPr>
+          <p:cNvPr id="9" name="Title 8"/>
+          <p:cNvSpPr>
+            <a:spLocks noGrp="1"/>
+          </p:cNvSpPr>
+          <p:nvPr>
+            <p:ph type="title"/>
+          </p:nvPr>
+        </p:nvSpPr>
+        <p:spPr/>
+        <p:txBody>
+          <a:bodyPr/>
+          <a:lstStyle/>
+          <a:p>
+            <a:r>
+              <a:rPr lang="en-US" altLang="zh-CN" sz="4400" dirty="0" smtClean="0"/>
+              <a:t>Nicholas C. </a:t>
+            </a:r>
+            <a:r>
+              <a:rPr lang="en-US" altLang="zh-CN" sz="4400" dirty="0" err="1" smtClean="0"/>
+              <a:t>Zakas</a:t>
+            </a:r>
+            <a:r>
+              <a:rPr lang="en-US" altLang="zh-CN" sz="4400" dirty="0" smtClean="0"/>
+              <a:t> </a:t>
+            </a:r>
+            <a:r>
+              <a:rPr lang="en-US" altLang="zh-CN" sz="4400" dirty="0"/>
+              <a:t/>
+            </a:r>
+            <a:br>
+              <a:rPr lang="en-US" altLang="zh-CN" sz="4400" dirty="0"/>
+            </a:br>
+            <a:endParaRPr lang="en-US" dirty="0"/>
+          </a:p>
+        </p:txBody>
+      </p:sp>
+      <p:pic>
+        <p:nvPicPr>
+          <p:cNvPr id="8" name="内容占位符 7" descr="51DkGoh2StL._SX258_BO1,204,203,200_.jpg"/>
+          <p:cNvPicPr>
+            <a:picLocks noGrp="1" noChangeAspect="1"/>
+          </p:cNvPicPr>
+          <p:nvPr>
+            <p:ph sz="half" idx="2"/>
+          </p:nvPr>
+        </p:nvPicPr>
+        <p:blipFill>
+          <a:blip r:embed="rId3"/>
+          <a:stretch>
+            <a:fillRect/>
+          </a:stretch>
+        </p:blipFill>
+        <p:spPr>
+          <a:xfrm>
+            <a:off x="5947568" y="1921271"/>
+            <a:ext cx="3177946" cy="4022329"/>
+          </a:xfrm>
+        </p:spPr>
+      </p:pic>
+      <p:pic>
+        <p:nvPicPr>
+          <p:cNvPr id="7" name="内容占位符 6" descr="4e4c982a3f4f0ad8976f74.L._V393513896_SX200_.jpg"/>
+          <p:cNvPicPr>
+            <a:picLocks noGrp="1" noChangeAspect="1"/>
+          </p:cNvPicPr>
+          <p:nvPr>
+            <p:ph sz="half" idx="1"/>
+          </p:nvPr>
+        </p:nvPicPr>
+        <p:blipFill>
+          <a:blip r:embed="rId4"/>
+          <a:stretch>
+            <a:fillRect/>
+          </a:stretch>
+        </p:blipFill>
+        <p:spPr>
+          <a:xfrm>
+            <a:off x="1796256" y="1921271"/>
+            <a:ext cx="2890044" cy="4022329"/>
           </a:xfrm>
         </p:spPr>
       </p:pic>
@@ -20157,16 +20991,8 @@
               <a:t>    </a:t>
             </a:r>
             <a:r>
-              <a:rPr lang="en-US" altLang="zh-CN" sz="2400" dirty="0" err="1" smtClean="0"/>
-              <a:t>var</a:t>
-            </a:r>
-            <a:r>
               <a:rPr lang="en-US" altLang="zh-CN" sz="2400" dirty="0" smtClean="0"/>
-              <a:t> </a:t>
-            </a:r>
-            <a:r>
-              <a:rPr lang="en-US" altLang="zh-CN" sz="2400" dirty="0"/>
-              <a:t>age=20</a:t>
+              <a:t> name=20</a:t>
             </a:r>
             <a:r>
               <a:rPr lang="zh-CN" altLang="en-US" sz="2400" dirty="0"/>

</xml_diff>